<commit_message>
React Phase 2 Complete
</commit_message>
<xml_diff>
--- a/SpotPPTs.pptx
+++ b/SpotPPTs.pptx
@@ -47,6 +47,9 @@
     <p:sldId id="295" r:id="rId41"/>
     <p:sldId id="296" r:id="rId42"/>
     <p:sldId id="297" r:id="rId43"/>
+    <p:sldId id="298" r:id="rId44"/>
+    <p:sldId id="299" r:id="rId45"/>
+    <p:sldId id="300" r:id="rId46"/>
   </p:sldIdLst>
   <p:sldSz cx="12192000" cy="6858000"/>
   <p:notesSz cx="6858000" cy="9144000"/>
@@ -302,7 +305,7 @@
           <a:p>
             <a:fld id="{6B75415C-91ED-7941-9068-396BBFB028E8}" type="datetimeFigureOut">
               <a:rPr lang="en-US" smtClean="0"/>
-              <a:t>4/30/21</a:t>
+              <a:t>5/6/21</a:t>
             </a:fld>
             <a:endParaRPr lang="en-US"/>
           </a:p>
@@ -502,7 +505,7 @@
           <a:p>
             <a:fld id="{6B75415C-91ED-7941-9068-396BBFB028E8}" type="datetimeFigureOut">
               <a:rPr lang="en-US" smtClean="0"/>
-              <a:t>4/30/21</a:t>
+              <a:t>5/6/21</a:t>
             </a:fld>
             <a:endParaRPr lang="en-US"/>
           </a:p>
@@ -712,7 +715,7 @@
           <a:p>
             <a:fld id="{6B75415C-91ED-7941-9068-396BBFB028E8}" type="datetimeFigureOut">
               <a:rPr lang="en-US" smtClean="0"/>
-              <a:t>4/30/21</a:t>
+              <a:t>5/6/21</a:t>
             </a:fld>
             <a:endParaRPr lang="en-US"/>
           </a:p>
@@ -912,7 +915,7 @@
           <a:p>
             <a:fld id="{6B75415C-91ED-7941-9068-396BBFB028E8}" type="datetimeFigureOut">
               <a:rPr lang="en-US" smtClean="0"/>
-              <a:t>4/30/21</a:t>
+              <a:t>5/6/21</a:t>
             </a:fld>
             <a:endParaRPr lang="en-US"/>
           </a:p>
@@ -1188,7 +1191,7 @@
           <a:p>
             <a:fld id="{6B75415C-91ED-7941-9068-396BBFB028E8}" type="datetimeFigureOut">
               <a:rPr lang="en-US" smtClean="0"/>
-              <a:t>4/30/21</a:t>
+              <a:t>5/6/21</a:t>
             </a:fld>
             <a:endParaRPr lang="en-US"/>
           </a:p>
@@ -1456,7 +1459,7 @@
           <a:p>
             <a:fld id="{6B75415C-91ED-7941-9068-396BBFB028E8}" type="datetimeFigureOut">
               <a:rPr lang="en-US" smtClean="0"/>
-              <a:t>4/30/21</a:t>
+              <a:t>5/6/21</a:t>
             </a:fld>
             <a:endParaRPr lang="en-US"/>
           </a:p>
@@ -1871,7 +1874,7 @@
           <a:p>
             <a:fld id="{6B75415C-91ED-7941-9068-396BBFB028E8}" type="datetimeFigureOut">
               <a:rPr lang="en-US" smtClean="0"/>
-              <a:t>4/30/21</a:t>
+              <a:t>5/6/21</a:t>
             </a:fld>
             <a:endParaRPr lang="en-US"/>
           </a:p>
@@ -2013,7 +2016,7 @@
           <a:p>
             <a:fld id="{6B75415C-91ED-7941-9068-396BBFB028E8}" type="datetimeFigureOut">
               <a:rPr lang="en-US" smtClean="0"/>
-              <a:t>4/30/21</a:t>
+              <a:t>5/6/21</a:t>
             </a:fld>
             <a:endParaRPr lang="en-US"/>
           </a:p>
@@ -2126,7 +2129,7 @@
           <a:p>
             <a:fld id="{6B75415C-91ED-7941-9068-396BBFB028E8}" type="datetimeFigureOut">
               <a:rPr lang="en-US" smtClean="0"/>
-              <a:t>4/30/21</a:t>
+              <a:t>5/6/21</a:t>
             </a:fld>
             <a:endParaRPr lang="en-US"/>
           </a:p>
@@ -2439,7 +2442,7 @@
           <a:p>
             <a:fld id="{6B75415C-91ED-7941-9068-396BBFB028E8}" type="datetimeFigureOut">
               <a:rPr lang="en-US" smtClean="0"/>
-              <a:t>4/30/21</a:t>
+              <a:t>5/6/21</a:t>
             </a:fld>
             <a:endParaRPr lang="en-US"/>
           </a:p>
@@ -2728,7 +2731,7 @@
           <a:p>
             <a:fld id="{6B75415C-91ED-7941-9068-396BBFB028E8}" type="datetimeFigureOut">
               <a:rPr lang="en-US" smtClean="0"/>
-              <a:t>4/30/21</a:t>
+              <a:t>5/6/21</a:t>
             </a:fld>
             <a:endParaRPr lang="en-US"/>
           </a:p>
@@ -2971,7 +2974,7 @@
           <a:p>
             <a:fld id="{6B75415C-91ED-7941-9068-396BBFB028E8}" type="datetimeFigureOut">
               <a:rPr lang="en-US" smtClean="0"/>
-              <a:t>4/30/21</a:t>
+              <a:t>5/6/21</a:t>
             </a:fld>
             <a:endParaRPr lang="en-US"/>
           </a:p>
@@ -26186,6 +26189,2428 @@
 </p:sld>
 </file>
 
+<file path=ppt/slides/slide43.xml><?xml version="1.0" encoding="utf-8"?>
+<p:sld xmlns:a="http://schemas.openxmlformats.org/drawingml/2006/main" xmlns:r="http://schemas.openxmlformats.org/officeDocument/2006/relationships" xmlns:p="http://schemas.openxmlformats.org/presentationml/2006/main">
+  <p:cSld>
+    <p:spTree>
+      <p:nvGrpSpPr>
+        <p:cNvPr id="1" name=""/>
+        <p:cNvGrpSpPr/>
+        <p:nvPr/>
+      </p:nvGrpSpPr>
+      <p:grpSpPr>
+        <a:xfrm>
+          <a:off x="0" y="0"/>
+          <a:ext cx="0" cy="0"/>
+          <a:chOff x="0" y="0"/>
+          <a:chExt cx="0" cy="0"/>
+        </a:xfrm>
+      </p:grpSpPr>
+      <p:sp>
+        <p:nvSpPr>
+          <p:cNvPr id="2" name="TextBox 1">
+            <a:extLst>
+              <a:ext uri="{FF2B5EF4-FFF2-40B4-BE49-F238E27FC236}">
+                <a16:creationId xmlns:a16="http://schemas.microsoft.com/office/drawing/2014/main" id="{67B54838-AB60-0F4B-92DE-EBA9EC62874E}"/>
+              </a:ext>
+            </a:extLst>
+          </p:cNvPr>
+          <p:cNvSpPr txBox="1"/>
+          <p:nvPr/>
+        </p:nvSpPr>
+        <p:spPr>
+          <a:xfrm>
+            <a:off x="418011" y="766354"/>
+            <a:ext cx="1881052" cy="369332"/>
+          </a:xfrm>
+          <a:prstGeom prst="rect">
+            <a:avLst/>
+          </a:prstGeom>
+          <a:noFill/>
+        </p:spPr>
+        <p:txBody>
+          <a:bodyPr wrap="square" rtlCol="0">
+            <a:spAutoFit/>
+          </a:bodyPr>
+          <a:lstStyle/>
+          <a:p>
+            <a:r>
+              <a:rPr lang="en-US" dirty="0"/>
+              <a:t>Recursion 1</a:t>
+            </a:r>
+          </a:p>
+        </p:txBody>
+      </p:sp>
+      <p:cxnSp>
+        <p:nvCxnSpPr>
+          <p:cNvPr id="4" name="Straight Arrow Connector 3">
+            <a:extLst>
+              <a:ext uri="{FF2B5EF4-FFF2-40B4-BE49-F238E27FC236}">
+                <a16:creationId xmlns:a16="http://schemas.microsoft.com/office/drawing/2014/main" id="{6E1CD402-8A5A-3743-8017-3AE2F74119F7}"/>
+              </a:ext>
+            </a:extLst>
+          </p:cNvPr>
+          <p:cNvCxnSpPr>
+            <a:stCxn id="2" idx="3"/>
+          </p:cNvCxnSpPr>
+          <p:nvPr/>
+        </p:nvCxnSpPr>
+        <p:spPr>
+          <a:xfrm flipV="1">
+            <a:off x="2299063" y="940526"/>
+            <a:ext cx="1097280" cy="10494"/>
+          </a:xfrm>
+          <a:prstGeom prst="straightConnector1">
+            <a:avLst/>
+          </a:prstGeom>
+          <a:ln>
+            <a:tailEnd type="triangle"/>
+          </a:ln>
+        </p:spPr>
+        <p:style>
+          <a:lnRef idx="1">
+            <a:schemeClr val="accent1"/>
+          </a:lnRef>
+          <a:fillRef idx="0">
+            <a:schemeClr val="accent1"/>
+          </a:fillRef>
+          <a:effectRef idx="0">
+            <a:schemeClr val="accent1"/>
+          </a:effectRef>
+          <a:fontRef idx="minor">
+            <a:schemeClr val="tx1"/>
+          </a:fontRef>
+        </p:style>
+      </p:cxnSp>
+      <p:sp>
+        <p:nvSpPr>
+          <p:cNvPr id="5" name="Rounded Rectangle 4">
+            <a:extLst>
+              <a:ext uri="{FF2B5EF4-FFF2-40B4-BE49-F238E27FC236}">
+                <a16:creationId xmlns:a16="http://schemas.microsoft.com/office/drawing/2014/main" id="{A05097AD-E329-4D43-A200-1D1BECB4886C}"/>
+              </a:ext>
+            </a:extLst>
+          </p:cNvPr>
+          <p:cNvSpPr/>
+          <p:nvPr/>
+        </p:nvSpPr>
+        <p:spPr>
+          <a:xfrm>
+            <a:off x="3500846" y="766354"/>
+            <a:ext cx="1793965" cy="478972"/>
+          </a:xfrm>
+          <a:prstGeom prst="roundRect">
+            <a:avLst/>
+          </a:prstGeom>
+        </p:spPr>
+        <p:style>
+          <a:lnRef idx="2">
+            <a:schemeClr val="accent1">
+              <a:shade val="50000"/>
+            </a:schemeClr>
+          </a:lnRef>
+          <a:fillRef idx="1">
+            <a:schemeClr val="accent1"/>
+          </a:fillRef>
+          <a:effectRef idx="0">
+            <a:schemeClr val="accent1"/>
+          </a:effectRef>
+          <a:fontRef idx="minor">
+            <a:schemeClr val="lt1"/>
+          </a:fontRef>
+        </p:style>
+        <p:txBody>
+          <a:bodyPr rtlCol="0" anchor="ctr"/>
+          <a:lstStyle/>
+          <a:p>
+            <a:pPr algn="ctr"/>
+            <a:r>
+              <a:rPr lang="en-US" dirty="0"/>
+              <a:t>Result 1</a:t>
+            </a:r>
+          </a:p>
+        </p:txBody>
+      </p:sp>
+      <p:cxnSp>
+        <p:nvCxnSpPr>
+          <p:cNvPr id="7" name="Straight Arrow Connector 6">
+            <a:extLst>
+              <a:ext uri="{FF2B5EF4-FFF2-40B4-BE49-F238E27FC236}">
+                <a16:creationId xmlns:a16="http://schemas.microsoft.com/office/drawing/2014/main" id="{992E8331-44FC-924B-A2F8-63E1A3A52FAE}"/>
+              </a:ext>
+            </a:extLst>
+          </p:cNvPr>
+          <p:cNvCxnSpPr>
+            <a:stCxn id="5" idx="2"/>
+          </p:cNvCxnSpPr>
+          <p:nvPr/>
+        </p:nvCxnSpPr>
+        <p:spPr>
+          <a:xfrm>
+            <a:off x="4397829" y="1245326"/>
+            <a:ext cx="0" cy="862148"/>
+          </a:xfrm>
+          <a:prstGeom prst="straightConnector1">
+            <a:avLst/>
+          </a:prstGeom>
+          <a:ln>
+            <a:tailEnd type="triangle"/>
+          </a:ln>
+        </p:spPr>
+        <p:style>
+          <a:lnRef idx="1">
+            <a:schemeClr val="accent1"/>
+          </a:lnRef>
+          <a:fillRef idx="0">
+            <a:schemeClr val="accent1"/>
+          </a:fillRef>
+          <a:effectRef idx="0">
+            <a:schemeClr val="accent1"/>
+          </a:effectRef>
+          <a:fontRef idx="minor">
+            <a:schemeClr val="tx1"/>
+          </a:fontRef>
+        </p:style>
+      </p:cxnSp>
+      <p:sp>
+        <p:nvSpPr>
+          <p:cNvPr id="8" name="TextBox 7">
+            <a:extLst>
+              <a:ext uri="{FF2B5EF4-FFF2-40B4-BE49-F238E27FC236}">
+                <a16:creationId xmlns:a16="http://schemas.microsoft.com/office/drawing/2014/main" id="{6E793BB7-2DF2-1843-B15F-3809BC3DAEEA}"/>
+              </a:ext>
+            </a:extLst>
+          </p:cNvPr>
+          <p:cNvSpPr txBox="1"/>
+          <p:nvPr/>
+        </p:nvSpPr>
+        <p:spPr>
+          <a:xfrm>
+            <a:off x="3600994" y="2033451"/>
+            <a:ext cx="1881052" cy="369332"/>
+          </a:xfrm>
+          <a:prstGeom prst="rect">
+            <a:avLst/>
+          </a:prstGeom>
+          <a:noFill/>
+        </p:spPr>
+        <p:txBody>
+          <a:bodyPr wrap="square" rtlCol="0">
+            <a:spAutoFit/>
+          </a:bodyPr>
+          <a:lstStyle/>
+          <a:p>
+            <a:r>
+              <a:rPr lang="en-US" dirty="0"/>
+              <a:t>Recursion 2</a:t>
+            </a:r>
+          </a:p>
+        </p:txBody>
+      </p:sp>
+      <p:cxnSp>
+        <p:nvCxnSpPr>
+          <p:cNvPr id="9" name="Straight Arrow Connector 8">
+            <a:extLst>
+              <a:ext uri="{FF2B5EF4-FFF2-40B4-BE49-F238E27FC236}">
+                <a16:creationId xmlns:a16="http://schemas.microsoft.com/office/drawing/2014/main" id="{F3841C79-7610-FC44-8D10-6C1FAFFAEDB5}"/>
+              </a:ext>
+            </a:extLst>
+          </p:cNvPr>
+          <p:cNvCxnSpPr/>
+          <p:nvPr/>
+        </p:nvCxnSpPr>
+        <p:spPr>
+          <a:xfrm flipV="1">
+            <a:off x="4894217" y="2207623"/>
+            <a:ext cx="1097280" cy="10494"/>
+          </a:xfrm>
+          <a:prstGeom prst="straightConnector1">
+            <a:avLst/>
+          </a:prstGeom>
+          <a:ln>
+            <a:tailEnd type="triangle"/>
+          </a:ln>
+        </p:spPr>
+        <p:style>
+          <a:lnRef idx="1">
+            <a:schemeClr val="accent1"/>
+          </a:lnRef>
+          <a:fillRef idx="0">
+            <a:schemeClr val="accent1"/>
+          </a:fillRef>
+          <a:effectRef idx="0">
+            <a:schemeClr val="accent1"/>
+          </a:effectRef>
+          <a:fontRef idx="minor">
+            <a:schemeClr val="tx1"/>
+          </a:fontRef>
+        </p:style>
+      </p:cxnSp>
+      <p:sp>
+        <p:nvSpPr>
+          <p:cNvPr id="10" name="Rounded Rectangle 9">
+            <a:extLst>
+              <a:ext uri="{FF2B5EF4-FFF2-40B4-BE49-F238E27FC236}">
+                <a16:creationId xmlns:a16="http://schemas.microsoft.com/office/drawing/2014/main" id="{2C01C0E7-B2DD-0C47-8835-B6B7644BCD79}"/>
+              </a:ext>
+            </a:extLst>
+          </p:cNvPr>
+          <p:cNvSpPr/>
+          <p:nvPr/>
+        </p:nvSpPr>
+        <p:spPr>
+          <a:xfrm>
+            <a:off x="6096000" y="2033451"/>
+            <a:ext cx="1793965" cy="478972"/>
+          </a:xfrm>
+          <a:prstGeom prst="roundRect">
+            <a:avLst/>
+          </a:prstGeom>
+        </p:spPr>
+        <p:style>
+          <a:lnRef idx="2">
+            <a:schemeClr val="accent1">
+              <a:shade val="50000"/>
+            </a:schemeClr>
+          </a:lnRef>
+          <a:fillRef idx="1">
+            <a:schemeClr val="accent1"/>
+          </a:fillRef>
+          <a:effectRef idx="0">
+            <a:schemeClr val="accent1"/>
+          </a:effectRef>
+          <a:fontRef idx="minor">
+            <a:schemeClr val="lt1"/>
+          </a:fontRef>
+        </p:style>
+        <p:txBody>
+          <a:bodyPr rtlCol="0" anchor="ctr"/>
+          <a:lstStyle/>
+          <a:p>
+            <a:pPr algn="ctr"/>
+            <a:r>
+              <a:rPr lang="en-US" dirty="0"/>
+              <a:t>Result 2</a:t>
+            </a:r>
+          </a:p>
+        </p:txBody>
+      </p:sp>
+      <p:sp>
+        <p:nvSpPr>
+          <p:cNvPr id="11" name="&quot;No&quot; Symbol 10">
+            <a:extLst>
+              <a:ext uri="{FF2B5EF4-FFF2-40B4-BE49-F238E27FC236}">
+                <a16:creationId xmlns:a16="http://schemas.microsoft.com/office/drawing/2014/main" id="{87EE5BDA-E687-074D-9154-967B8029F30E}"/>
+              </a:ext>
+            </a:extLst>
+          </p:cNvPr>
+          <p:cNvSpPr/>
+          <p:nvPr/>
+        </p:nvSpPr>
+        <p:spPr>
+          <a:xfrm>
+            <a:off x="3762103" y="374469"/>
+            <a:ext cx="1271451" cy="1105988"/>
+          </a:xfrm>
+          <a:prstGeom prst="noSmoking">
+            <a:avLst/>
+          </a:prstGeom>
+          <a:solidFill>
+            <a:schemeClr val="accent2"/>
+          </a:solidFill>
+        </p:spPr>
+        <p:style>
+          <a:lnRef idx="2">
+            <a:schemeClr val="accent1">
+              <a:shade val="50000"/>
+            </a:schemeClr>
+          </a:lnRef>
+          <a:fillRef idx="1">
+            <a:schemeClr val="accent1"/>
+          </a:fillRef>
+          <a:effectRef idx="0">
+            <a:schemeClr val="accent1"/>
+          </a:effectRef>
+          <a:fontRef idx="minor">
+            <a:schemeClr val="lt1"/>
+          </a:fontRef>
+        </p:style>
+        <p:txBody>
+          <a:bodyPr rtlCol="0" anchor="ctr"/>
+          <a:lstStyle/>
+          <a:p>
+            <a:pPr algn="ctr"/>
+            <a:endParaRPr lang="en-US">
+              <a:solidFill>
+                <a:schemeClr val="tx1"/>
+              </a:solidFill>
+            </a:endParaRPr>
+          </a:p>
+        </p:txBody>
+      </p:sp>
+      <p:cxnSp>
+        <p:nvCxnSpPr>
+          <p:cNvPr id="12" name="Straight Arrow Connector 11">
+            <a:extLst>
+              <a:ext uri="{FF2B5EF4-FFF2-40B4-BE49-F238E27FC236}">
+                <a16:creationId xmlns:a16="http://schemas.microsoft.com/office/drawing/2014/main" id="{4E3124C9-0490-354D-B901-1B94E859E25C}"/>
+              </a:ext>
+            </a:extLst>
+          </p:cNvPr>
+          <p:cNvCxnSpPr/>
+          <p:nvPr/>
+        </p:nvCxnSpPr>
+        <p:spPr>
+          <a:xfrm>
+            <a:off x="7058298" y="2555966"/>
+            <a:ext cx="0" cy="862148"/>
+          </a:xfrm>
+          <a:prstGeom prst="straightConnector1">
+            <a:avLst/>
+          </a:prstGeom>
+          <a:ln>
+            <a:tailEnd type="triangle"/>
+          </a:ln>
+        </p:spPr>
+        <p:style>
+          <a:lnRef idx="1">
+            <a:schemeClr val="accent1"/>
+          </a:lnRef>
+          <a:fillRef idx="0">
+            <a:schemeClr val="accent1"/>
+          </a:fillRef>
+          <a:effectRef idx="0">
+            <a:schemeClr val="accent1"/>
+          </a:effectRef>
+          <a:fontRef idx="minor">
+            <a:schemeClr val="tx1"/>
+          </a:fontRef>
+        </p:style>
+      </p:cxnSp>
+      <p:sp>
+        <p:nvSpPr>
+          <p:cNvPr id="13" name="TextBox 12">
+            <a:extLst>
+              <a:ext uri="{FF2B5EF4-FFF2-40B4-BE49-F238E27FC236}">
+                <a16:creationId xmlns:a16="http://schemas.microsoft.com/office/drawing/2014/main" id="{694D98A0-01A6-1E4A-B36B-9C1C4D07D02D}"/>
+              </a:ext>
+            </a:extLst>
+          </p:cNvPr>
+          <p:cNvSpPr txBox="1"/>
+          <p:nvPr/>
+        </p:nvSpPr>
+        <p:spPr>
+          <a:xfrm>
+            <a:off x="6261463" y="3344091"/>
+            <a:ext cx="1881052" cy="369332"/>
+          </a:xfrm>
+          <a:prstGeom prst="rect">
+            <a:avLst/>
+          </a:prstGeom>
+          <a:noFill/>
+        </p:spPr>
+        <p:txBody>
+          <a:bodyPr wrap="square" rtlCol="0">
+            <a:spAutoFit/>
+          </a:bodyPr>
+          <a:lstStyle/>
+          <a:p>
+            <a:r>
+              <a:rPr lang="en-US" dirty="0"/>
+              <a:t>Recursion 3</a:t>
+            </a:r>
+          </a:p>
+        </p:txBody>
+      </p:sp>
+      <p:cxnSp>
+        <p:nvCxnSpPr>
+          <p:cNvPr id="14" name="Straight Arrow Connector 13">
+            <a:extLst>
+              <a:ext uri="{FF2B5EF4-FFF2-40B4-BE49-F238E27FC236}">
+                <a16:creationId xmlns:a16="http://schemas.microsoft.com/office/drawing/2014/main" id="{9309623E-3E06-3D45-8073-32D84798B62D}"/>
+              </a:ext>
+            </a:extLst>
+          </p:cNvPr>
+          <p:cNvCxnSpPr/>
+          <p:nvPr/>
+        </p:nvCxnSpPr>
+        <p:spPr>
+          <a:xfrm flipV="1">
+            <a:off x="7554686" y="3518263"/>
+            <a:ext cx="1097280" cy="10494"/>
+          </a:xfrm>
+          <a:prstGeom prst="straightConnector1">
+            <a:avLst/>
+          </a:prstGeom>
+          <a:ln>
+            <a:tailEnd type="triangle"/>
+          </a:ln>
+        </p:spPr>
+        <p:style>
+          <a:lnRef idx="1">
+            <a:schemeClr val="accent1"/>
+          </a:lnRef>
+          <a:fillRef idx="0">
+            <a:schemeClr val="accent1"/>
+          </a:fillRef>
+          <a:effectRef idx="0">
+            <a:schemeClr val="accent1"/>
+          </a:effectRef>
+          <a:fontRef idx="minor">
+            <a:schemeClr val="tx1"/>
+          </a:fontRef>
+        </p:style>
+      </p:cxnSp>
+      <p:sp>
+        <p:nvSpPr>
+          <p:cNvPr id="15" name="Rounded Rectangle 14">
+            <a:extLst>
+              <a:ext uri="{FF2B5EF4-FFF2-40B4-BE49-F238E27FC236}">
+                <a16:creationId xmlns:a16="http://schemas.microsoft.com/office/drawing/2014/main" id="{3C74B9D1-D4F7-A14C-98AE-99A41E6877CA}"/>
+              </a:ext>
+            </a:extLst>
+          </p:cNvPr>
+          <p:cNvSpPr/>
+          <p:nvPr/>
+        </p:nvSpPr>
+        <p:spPr>
+          <a:xfrm>
+            <a:off x="8756469" y="3344091"/>
+            <a:ext cx="1793965" cy="478972"/>
+          </a:xfrm>
+          <a:prstGeom prst="roundRect">
+            <a:avLst/>
+          </a:prstGeom>
+        </p:spPr>
+        <p:style>
+          <a:lnRef idx="2">
+            <a:schemeClr val="accent1">
+              <a:shade val="50000"/>
+            </a:schemeClr>
+          </a:lnRef>
+          <a:fillRef idx="1">
+            <a:schemeClr val="accent1"/>
+          </a:fillRef>
+          <a:effectRef idx="0">
+            <a:schemeClr val="accent1"/>
+          </a:effectRef>
+          <a:fontRef idx="minor">
+            <a:schemeClr val="lt1"/>
+          </a:fontRef>
+        </p:style>
+        <p:txBody>
+          <a:bodyPr rtlCol="0" anchor="ctr"/>
+          <a:lstStyle/>
+          <a:p>
+            <a:pPr algn="ctr"/>
+            <a:r>
+              <a:rPr lang="en-US" dirty="0"/>
+              <a:t>Result 3</a:t>
+            </a:r>
+          </a:p>
+        </p:txBody>
+      </p:sp>
+      <p:sp>
+        <p:nvSpPr>
+          <p:cNvPr id="16" name="&quot;No&quot; Symbol 15">
+            <a:extLst>
+              <a:ext uri="{FF2B5EF4-FFF2-40B4-BE49-F238E27FC236}">
+                <a16:creationId xmlns:a16="http://schemas.microsoft.com/office/drawing/2014/main" id="{C1B5C205-00E7-D641-8626-215C7833C0E3}"/>
+              </a:ext>
+            </a:extLst>
+          </p:cNvPr>
+          <p:cNvSpPr/>
+          <p:nvPr/>
+        </p:nvSpPr>
+        <p:spPr>
+          <a:xfrm>
+            <a:off x="6422572" y="1665123"/>
+            <a:ext cx="1271451" cy="1105988"/>
+          </a:xfrm>
+          <a:prstGeom prst="noSmoking">
+            <a:avLst/>
+          </a:prstGeom>
+          <a:solidFill>
+            <a:schemeClr val="accent2"/>
+          </a:solidFill>
+        </p:spPr>
+        <p:style>
+          <a:lnRef idx="2">
+            <a:schemeClr val="accent1">
+              <a:shade val="50000"/>
+            </a:schemeClr>
+          </a:lnRef>
+          <a:fillRef idx="1">
+            <a:schemeClr val="accent1"/>
+          </a:fillRef>
+          <a:effectRef idx="0">
+            <a:schemeClr val="accent1"/>
+          </a:effectRef>
+          <a:fontRef idx="minor">
+            <a:schemeClr val="lt1"/>
+          </a:fontRef>
+        </p:style>
+        <p:txBody>
+          <a:bodyPr rtlCol="0" anchor="ctr"/>
+          <a:lstStyle/>
+          <a:p>
+            <a:pPr algn="ctr"/>
+            <a:endParaRPr lang="en-US">
+              <a:solidFill>
+                <a:schemeClr val="tx1"/>
+              </a:solidFill>
+            </a:endParaRPr>
+          </a:p>
+        </p:txBody>
+      </p:sp>
+    </p:spTree>
+    <p:extLst>
+      <p:ext uri="{BB962C8B-B14F-4D97-AF65-F5344CB8AC3E}">
+        <p14:creationId xmlns:p14="http://schemas.microsoft.com/office/powerpoint/2010/main" val="207495980"/>
+      </p:ext>
+    </p:extLst>
+  </p:cSld>
+  <p:clrMapOvr>
+    <a:masterClrMapping/>
+  </p:clrMapOvr>
+</p:sld>
+</file>
+
+<file path=ppt/slides/slide44.xml><?xml version="1.0" encoding="utf-8"?>
+<p:sld xmlns:a="http://schemas.openxmlformats.org/drawingml/2006/main" xmlns:r="http://schemas.openxmlformats.org/officeDocument/2006/relationships" xmlns:p="http://schemas.openxmlformats.org/presentationml/2006/main">
+  <p:cSld>
+    <p:spTree>
+      <p:nvGrpSpPr>
+        <p:cNvPr id="1" name=""/>
+        <p:cNvGrpSpPr/>
+        <p:nvPr/>
+      </p:nvGrpSpPr>
+      <p:grpSpPr>
+        <a:xfrm>
+          <a:off x="0" y="0"/>
+          <a:ext cx="0" cy="0"/>
+          <a:chOff x="0" y="0"/>
+          <a:chExt cx="0" cy="0"/>
+        </a:xfrm>
+      </p:grpSpPr>
+      <p:sp>
+        <p:nvSpPr>
+          <p:cNvPr id="2" name="Rectangle 1">
+            <a:extLst>
+              <a:ext uri="{FF2B5EF4-FFF2-40B4-BE49-F238E27FC236}">
+                <a16:creationId xmlns:a16="http://schemas.microsoft.com/office/drawing/2014/main" id="{27A2CA18-E8FC-DF48-B9D4-CCE1CA72A41D}"/>
+              </a:ext>
+            </a:extLst>
+          </p:cNvPr>
+          <p:cNvSpPr/>
+          <p:nvPr/>
+        </p:nvSpPr>
+        <p:spPr>
+          <a:xfrm>
+            <a:off x="452846" y="452846"/>
+            <a:ext cx="11408228" cy="6217920"/>
+          </a:xfrm>
+          <a:prstGeom prst="rect">
+            <a:avLst/>
+          </a:prstGeom>
+        </p:spPr>
+        <p:style>
+          <a:lnRef idx="2">
+            <a:schemeClr val="accent6"/>
+          </a:lnRef>
+          <a:fillRef idx="1">
+            <a:schemeClr val="lt1"/>
+          </a:fillRef>
+          <a:effectRef idx="0">
+            <a:schemeClr val="accent6"/>
+          </a:effectRef>
+          <a:fontRef idx="minor">
+            <a:schemeClr val="dk1"/>
+          </a:fontRef>
+        </p:style>
+        <p:txBody>
+          <a:bodyPr rtlCol="0" anchor="ctr"/>
+          <a:lstStyle/>
+          <a:p>
+            <a:pPr algn="ctr"/>
+            <a:endParaRPr lang="en-US"/>
+          </a:p>
+        </p:txBody>
+      </p:sp>
+      <p:sp>
+        <p:nvSpPr>
+          <p:cNvPr id="3" name="TextBox 2">
+            <a:extLst>
+              <a:ext uri="{FF2B5EF4-FFF2-40B4-BE49-F238E27FC236}">
+                <a16:creationId xmlns:a16="http://schemas.microsoft.com/office/drawing/2014/main" id="{FEAD5ABC-8915-DA49-B03F-300E6032D7FA}"/>
+              </a:ext>
+            </a:extLst>
+          </p:cNvPr>
+          <p:cNvSpPr txBox="1"/>
+          <p:nvPr/>
+        </p:nvSpPr>
+        <p:spPr>
+          <a:xfrm>
+            <a:off x="3979817" y="600891"/>
+            <a:ext cx="3884023" cy="369332"/>
+          </a:xfrm>
+          <a:prstGeom prst="rect">
+            <a:avLst/>
+          </a:prstGeom>
+          <a:noFill/>
+        </p:spPr>
+        <p:txBody>
+          <a:bodyPr wrap="square" rtlCol="0">
+            <a:spAutoFit/>
+          </a:bodyPr>
+          <a:lstStyle/>
+          <a:p>
+            <a:pPr algn="ctr"/>
+            <a:r>
+              <a:rPr lang="en-US" dirty="0"/>
+              <a:t>Container Component</a:t>
+            </a:r>
+          </a:p>
+        </p:txBody>
+      </p:sp>
+      <p:sp>
+        <p:nvSpPr>
+          <p:cNvPr id="4" name="Rounded Rectangle 3">
+            <a:extLst>
+              <a:ext uri="{FF2B5EF4-FFF2-40B4-BE49-F238E27FC236}">
+                <a16:creationId xmlns:a16="http://schemas.microsoft.com/office/drawing/2014/main" id="{1E04D8F1-C455-894D-B6FF-5E37EF8A6B59}"/>
+              </a:ext>
+            </a:extLst>
+          </p:cNvPr>
+          <p:cNvSpPr/>
+          <p:nvPr/>
+        </p:nvSpPr>
+        <p:spPr>
+          <a:xfrm>
+            <a:off x="827314" y="1611086"/>
+            <a:ext cx="1846217" cy="1994263"/>
+          </a:xfrm>
+          <a:prstGeom prst="roundRect">
+            <a:avLst/>
+          </a:prstGeom>
+        </p:spPr>
+        <p:style>
+          <a:lnRef idx="2">
+            <a:schemeClr val="accent1">
+              <a:shade val="50000"/>
+            </a:schemeClr>
+          </a:lnRef>
+          <a:fillRef idx="1">
+            <a:schemeClr val="accent1"/>
+          </a:fillRef>
+          <a:effectRef idx="0">
+            <a:schemeClr val="accent1"/>
+          </a:effectRef>
+          <a:fontRef idx="minor">
+            <a:schemeClr val="lt1"/>
+          </a:fontRef>
+        </p:style>
+        <p:txBody>
+          <a:bodyPr rtlCol="0" anchor="ctr"/>
+          <a:lstStyle/>
+          <a:p>
+            <a:pPr algn="ctr"/>
+            <a:r>
+              <a:rPr lang="en-US" dirty="0"/>
+              <a:t>C1</a:t>
+            </a:r>
+          </a:p>
+        </p:txBody>
+      </p:sp>
+      <p:sp>
+        <p:nvSpPr>
+          <p:cNvPr id="5" name="Rounded Rectangle 4">
+            <a:extLst>
+              <a:ext uri="{FF2B5EF4-FFF2-40B4-BE49-F238E27FC236}">
+                <a16:creationId xmlns:a16="http://schemas.microsoft.com/office/drawing/2014/main" id="{86BB9395-3550-A54F-ACC4-1D394E73ACFA}"/>
+              </a:ext>
+            </a:extLst>
+          </p:cNvPr>
+          <p:cNvSpPr/>
+          <p:nvPr/>
+        </p:nvSpPr>
+        <p:spPr>
+          <a:xfrm>
+            <a:off x="3156856" y="1676401"/>
+            <a:ext cx="1846217" cy="1994263"/>
+          </a:xfrm>
+          <a:prstGeom prst="roundRect">
+            <a:avLst/>
+          </a:prstGeom>
+        </p:spPr>
+        <p:style>
+          <a:lnRef idx="2">
+            <a:schemeClr val="accent1">
+              <a:shade val="50000"/>
+            </a:schemeClr>
+          </a:lnRef>
+          <a:fillRef idx="1">
+            <a:schemeClr val="accent1"/>
+          </a:fillRef>
+          <a:effectRef idx="0">
+            <a:schemeClr val="accent1"/>
+          </a:effectRef>
+          <a:fontRef idx="minor">
+            <a:schemeClr val="lt1"/>
+          </a:fontRef>
+        </p:style>
+        <p:txBody>
+          <a:bodyPr rtlCol="0" anchor="ctr"/>
+          <a:lstStyle/>
+          <a:p>
+            <a:pPr algn="ctr"/>
+            <a:r>
+              <a:rPr lang="en-US" dirty="0"/>
+              <a:t>C2</a:t>
+            </a:r>
+          </a:p>
+        </p:txBody>
+      </p:sp>
+      <p:sp>
+        <p:nvSpPr>
+          <p:cNvPr id="6" name="Rounded Rectangle 5">
+            <a:extLst>
+              <a:ext uri="{FF2B5EF4-FFF2-40B4-BE49-F238E27FC236}">
+                <a16:creationId xmlns:a16="http://schemas.microsoft.com/office/drawing/2014/main" id="{C12278BF-A979-C048-94B9-426991F44DC1}"/>
+              </a:ext>
+            </a:extLst>
+          </p:cNvPr>
+          <p:cNvSpPr/>
+          <p:nvPr/>
+        </p:nvSpPr>
+        <p:spPr>
+          <a:xfrm>
+            <a:off x="6344194" y="1676401"/>
+            <a:ext cx="1846217" cy="4471850"/>
+          </a:xfrm>
+          <a:prstGeom prst="roundRect">
+            <a:avLst/>
+          </a:prstGeom>
+        </p:spPr>
+        <p:style>
+          <a:lnRef idx="2">
+            <a:schemeClr val="accent1">
+              <a:shade val="50000"/>
+            </a:schemeClr>
+          </a:lnRef>
+          <a:fillRef idx="1">
+            <a:schemeClr val="accent1"/>
+          </a:fillRef>
+          <a:effectRef idx="0">
+            <a:schemeClr val="accent1"/>
+          </a:effectRef>
+          <a:fontRef idx="minor">
+            <a:schemeClr val="lt1"/>
+          </a:fontRef>
+        </p:style>
+        <p:txBody>
+          <a:bodyPr rtlCol="0" anchor="ctr"/>
+          <a:lstStyle/>
+          <a:p>
+            <a:pPr algn="ctr"/>
+            <a:r>
+              <a:rPr lang="en-US" dirty="0"/>
+              <a:t>C3</a:t>
+            </a:r>
+          </a:p>
+        </p:txBody>
+      </p:sp>
+      <p:sp>
+        <p:nvSpPr>
+          <p:cNvPr id="7" name="Rectangle 6">
+            <a:extLst>
+              <a:ext uri="{FF2B5EF4-FFF2-40B4-BE49-F238E27FC236}">
+                <a16:creationId xmlns:a16="http://schemas.microsoft.com/office/drawing/2014/main" id="{B6218BF8-50D9-694F-81E4-C6052EA815EA}"/>
+              </a:ext>
+            </a:extLst>
+          </p:cNvPr>
+          <p:cNvSpPr/>
+          <p:nvPr/>
+        </p:nvSpPr>
+        <p:spPr>
+          <a:xfrm>
+            <a:off x="6514011" y="4258491"/>
+            <a:ext cx="1463040" cy="1520428"/>
+          </a:xfrm>
+          <a:prstGeom prst="rect">
+            <a:avLst/>
+          </a:prstGeom>
+          <a:solidFill>
+            <a:schemeClr val="accent2"/>
+          </a:solidFill>
+        </p:spPr>
+        <p:style>
+          <a:lnRef idx="2">
+            <a:schemeClr val="accent1">
+              <a:shade val="50000"/>
+            </a:schemeClr>
+          </a:lnRef>
+          <a:fillRef idx="1">
+            <a:schemeClr val="accent1"/>
+          </a:fillRef>
+          <a:effectRef idx="0">
+            <a:schemeClr val="accent1"/>
+          </a:effectRef>
+          <a:fontRef idx="minor">
+            <a:schemeClr val="lt1"/>
+          </a:fontRef>
+        </p:style>
+        <p:txBody>
+          <a:bodyPr rtlCol="0" anchor="ctr"/>
+          <a:lstStyle/>
+          <a:p>
+            <a:pPr algn="ctr"/>
+            <a:r>
+              <a:rPr lang="en-US" dirty="0"/>
+              <a:t>C3.1</a:t>
+            </a:r>
+          </a:p>
+        </p:txBody>
+      </p:sp>
+      <p:sp>
+        <p:nvSpPr>
+          <p:cNvPr id="8" name="Rounded Rectangle 7">
+            <a:extLst>
+              <a:ext uri="{FF2B5EF4-FFF2-40B4-BE49-F238E27FC236}">
+                <a16:creationId xmlns:a16="http://schemas.microsoft.com/office/drawing/2014/main" id="{C0373A5E-ED35-6D43-B6F5-036A3074FE0F}"/>
+              </a:ext>
+            </a:extLst>
+          </p:cNvPr>
+          <p:cNvSpPr/>
+          <p:nvPr/>
+        </p:nvSpPr>
+        <p:spPr>
+          <a:xfrm>
+            <a:off x="8421187" y="1675619"/>
+            <a:ext cx="3222173" cy="4629387"/>
+          </a:xfrm>
+          <a:prstGeom prst="roundRect">
+            <a:avLst/>
+          </a:prstGeom>
+        </p:spPr>
+        <p:style>
+          <a:lnRef idx="2">
+            <a:schemeClr val="accent1">
+              <a:shade val="50000"/>
+            </a:schemeClr>
+          </a:lnRef>
+          <a:fillRef idx="1">
+            <a:schemeClr val="accent1"/>
+          </a:fillRef>
+          <a:effectRef idx="0">
+            <a:schemeClr val="accent1"/>
+          </a:effectRef>
+          <a:fontRef idx="minor">
+            <a:schemeClr val="lt1"/>
+          </a:fontRef>
+        </p:style>
+        <p:txBody>
+          <a:bodyPr rtlCol="0" anchor="ctr"/>
+          <a:lstStyle/>
+          <a:p>
+            <a:pPr algn="ctr"/>
+            <a:r>
+              <a:rPr lang="en-US" dirty="0"/>
+              <a:t>C4</a:t>
+            </a:r>
+          </a:p>
+        </p:txBody>
+      </p:sp>
+      <p:sp>
+        <p:nvSpPr>
+          <p:cNvPr id="9" name="Rectangle 8">
+            <a:extLst>
+              <a:ext uri="{FF2B5EF4-FFF2-40B4-BE49-F238E27FC236}">
+                <a16:creationId xmlns:a16="http://schemas.microsoft.com/office/drawing/2014/main" id="{91131010-4D15-1F4C-9E7D-1315C93721D1}"/>
+              </a:ext>
+            </a:extLst>
+          </p:cNvPr>
+          <p:cNvSpPr/>
+          <p:nvPr/>
+        </p:nvSpPr>
+        <p:spPr>
+          <a:xfrm>
+            <a:off x="8569233" y="4258491"/>
+            <a:ext cx="1463040" cy="1520428"/>
+          </a:xfrm>
+          <a:prstGeom prst="rect">
+            <a:avLst/>
+          </a:prstGeom>
+          <a:solidFill>
+            <a:schemeClr val="accent2"/>
+          </a:solidFill>
+        </p:spPr>
+        <p:style>
+          <a:lnRef idx="2">
+            <a:schemeClr val="accent1">
+              <a:shade val="50000"/>
+            </a:schemeClr>
+          </a:lnRef>
+          <a:fillRef idx="1">
+            <a:schemeClr val="accent1"/>
+          </a:fillRef>
+          <a:effectRef idx="0">
+            <a:schemeClr val="accent1"/>
+          </a:effectRef>
+          <a:fontRef idx="minor">
+            <a:schemeClr val="lt1"/>
+          </a:fontRef>
+        </p:style>
+        <p:txBody>
+          <a:bodyPr rtlCol="0" anchor="ctr"/>
+          <a:lstStyle/>
+          <a:p>
+            <a:pPr algn="ctr"/>
+            <a:r>
+              <a:rPr lang="en-US" dirty="0"/>
+              <a:t>C4.1</a:t>
+            </a:r>
+          </a:p>
+        </p:txBody>
+      </p:sp>
+      <p:sp>
+        <p:nvSpPr>
+          <p:cNvPr id="10" name="Rectangle 9">
+            <a:extLst>
+              <a:ext uri="{FF2B5EF4-FFF2-40B4-BE49-F238E27FC236}">
+                <a16:creationId xmlns:a16="http://schemas.microsoft.com/office/drawing/2014/main" id="{F76F75D1-9D15-F143-B77B-B8319F71E040}"/>
+              </a:ext>
+            </a:extLst>
+          </p:cNvPr>
+          <p:cNvSpPr/>
+          <p:nvPr/>
+        </p:nvSpPr>
+        <p:spPr>
+          <a:xfrm>
+            <a:off x="10106296" y="4258490"/>
+            <a:ext cx="1463040" cy="1469181"/>
+          </a:xfrm>
+          <a:prstGeom prst="rect">
+            <a:avLst/>
+          </a:prstGeom>
+          <a:solidFill>
+            <a:schemeClr val="accent2"/>
+          </a:solidFill>
+        </p:spPr>
+        <p:style>
+          <a:lnRef idx="2">
+            <a:schemeClr val="accent1">
+              <a:shade val="50000"/>
+            </a:schemeClr>
+          </a:lnRef>
+          <a:fillRef idx="1">
+            <a:schemeClr val="accent1"/>
+          </a:fillRef>
+          <a:effectRef idx="0">
+            <a:schemeClr val="accent1"/>
+          </a:effectRef>
+          <a:fontRef idx="minor">
+            <a:schemeClr val="lt1"/>
+          </a:fontRef>
+        </p:style>
+        <p:txBody>
+          <a:bodyPr rtlCol="0" anchor="ctr"/>
+          <a:lstStyle/>
+          <a:p>
+            <a:pPr algn="ctr"/>
+            <a:r>
+              <a:rPr lang="en-US" dirty="0"/>
+              <a:t>C4.2</a:t>
+            </a:r>
+          </a:p>
+        </p:txBody>
+      </p:sp>
+      <p:sp>
+        <p:nvSpPr>
+          <p:cNvPr id="12" name="Down Arrow 11">
+            <a:extLst>
+              <a:ext uri="{FF2B5EF4-FFF2-40B4-BE49-F238E27FC236}">
+                <a16:creationId xmlns:a16="http://schemas.microsoft.com/office/drawing/2014/main" id="{CB199171-F865-D54C-BEE4-6B2C70980598}"/>
+              </a:ext>
+            </a:extLst>
+          </p:cNvPr>
+          <p:cNvSpPr/>
+          <p:nvPr/>
+        </p:nvSpPr>
+        <p:spPr>
+          <a:xfrm>
+            <a:off x="7611291" y="3857897"/>
+            <a:ext cx="156755" cy="714103"/>
+          </a:xfrm>
+          <a:prstGeom prst="downArrow">
+            <a:avLst/>
+          </a:prstGeom>
+        </p:spPr>
+        <p:style>
+          <a:lnRef idx="2">
+            <a:schemeClr val="accent1">
+              <a:shade val="50000"/>
+            </a:schemeClr>
+          </a:lnRef>
+          <a:fillRef idx="1">
+            <a:schemeClr val="accent1"/>
+          </a:fillRef>
+          <a:effectRef idx="0">
+            <a:schemeClr val="accent1"/>
+          </a:effectRef>
+          <a:fontRef idx="minor">
+            <a:schemeClr val="lt1"/>
+          </a:fontRef>
+        </p:style>
+        <p:txBody>
+          <a:bodyPr rtlCol="0" anchor="ctr"/>
+          <a:lstStyle/>
+          <a:p>
+            <a:pPr algn="ctr"/>
+            <a:endParaRPr lang="en-US"/>
+          </a:p>
+        </p:txBody>
+      </p:sp>
+      <p:cxnSp>
+        <p:nvCxnSpPr>
+          <p:cNvPr id="14" name="Straight Arrow Connector 13">
+            <a:extLst>
+              <a:ext uri="{FF2B5EF4-FFF2-40B4-BE49-F238E27FC236}">
+                <a16:creationId xmlns:a16="http://schemas.microsoft.com/office/drawing/2014/main" id="{CA60A52B-AC53-1D45-8F86-E8E41C59F704}"/>
+              </a:ext>
+            </a:extLst>
+          </p:cNvPr>
+          <p:cNvCxnSpPr>
+            <a:stCxn id="3" idx="2"/>
+            <a:endCxn id="4" idx="0"/>
+          </p:cNvCxnSpPr>
+          <p:nvPr/>
+        </p:nvCxnSpPr>
+        <p:spPr>
+          <a:xfrm flipH="1">
+            <a:off x="1750423" y="970223"/>
+            <a:ext cx="4171406" cy="640863"/>
+          </a:xfrm>
+          <a:prstGeom prst="straightConnector1">
+            <a:avLst/>
+          </a:prstGeom>
+          <a:ln>
+            <a:tailEnd type="triangle"/>
+          </a:ln>
+        </p:spPr>
+        <p:style>
+          <a:lnRef idx="3">
+            <a:schemeClr val="dk1"/>
+          </a:lnRef>
+          <a:fillRef idx="0">
+            <a:schemeClr val="dk1"/>
+          </a:fillRef>
+          <a:effectRef idx="2">
+            <a:schemeClr val="dk1"/>
+          </a:effectRef>
+          <a:fontRef idx="minor">
+            <a:schemeClr val="tx1"/>
+          </a:fontRef>
+        </p:style>
+      </p:cxnSp>
+      <p:cxnSp>
+        <p:nvCxnSpPr>
+          <p:cNvPr id="15" name="Straight Arrow Connector 14">
+            <a:extLst>
+              <a:ext uri="{FF2B5EF4-FFF2-40B4-BE49-F238E27FC236}">
+                <a16:creationId xmlns:a16="http://schemas.microsoft.com/office/drawing/2014/main" id="{FC31828D-9C9F-7247-A55E-B750CE67CD74}"/>
+              </a:ext>
+            </a:extLst>
+          </p:cNvPr>
+          <p:cNvCxnSpPr>
+            <a:cxnSpLocks/>
+            <a:stCxn id="3" idx="2"/>
+            <a:endCxn id="5" idx="0"/>
+          </p:cNvCxnSpPr>
+          <p:nvPr/>
+        </p:nvCxnSpPr>
+        <p:spPr>
+          <a:xfrm flipH="1">
+            <a:off x="4079965" y="970223"/>
+            <a:ext cx="1841864" cy="706178"/>
+          </a:xfrm>
+          <a:prstGeom prst="straightConnector1">
+            <a:avLst/>
+          </a:prstGeom>
+          <a:ln>
+            <a:tailEnd type="triangle"/>
+          </a:ln>
+        </p:spPr>
+        <p:style>
+          <a:lnRef idx="3">
+            <a:schemeClr val="dk1"/>
+          </a:lnRef>
+          <a:fillRef idx="0">
+            <a:schemeClr val="dk1"/>
+          </a:fillRef>
+          <a:effectRef idx="2">
+            <a:schemeClr val="dk1"/>
+          </a:effectRef>
+          <a:fontRef idx="minor">
+            <a:schemeClr val="tx1"/>
+          </a:fontRef>
+        </p:style>
+      </p:cxnSp>
+      <p:cxnSp>
+        <p:nvCxnSpPr>
+          <p:cNvPr id="18" name="Straight Arrow Connector 17">
+            <a:extLst>
+              <a:ext uri="{FF2B5EF4-FFF2-40B4-BE49-F238E27FC236}">
+                <a16:creationId xmlns:a16="http://schemas.microsoft.com/office/drawing/2014/main" id="{B87E0B29-9BCE-0142-805E-3E35636DA47B}"/>
+              </a:ext>
+            </a:extLst>
+          </p:cNvPr>
+          <p:cNvCxnSpPr>
+            <a:cxnSpLocks/>
+            <a:stCxn id="3" idx="2"/>
+          </p:cNvCxnSpPr>
+          <p:nvPr/>
+        </p:nvCxnSpPr>
+        <p:spPr>
+          <a:xfrm>
+            <a:off x="5921829" y="970223"/>
+            <a:ext cx="1267100" cy="705396"/>
+          </a:xfrm>
+          <a:prstGeom prst="straightConnector1">
+            <a:avLst/>
+          </a:prstGeom>
+          <a:ln>
+            <a:tailEnd type="triangle"/>
+          </a:ln>
+        </p:spPr>
+        <p:style>
+          <a:lnRef idx="3">
+            <a:schemeClr val="dk1"/>
+          </a:lnRef>
+          <a:fillRef idx="0">
+            <a:schemeClr val="dk1"/>
+          </a:fillRef>
+          <a:effectRef idx="2">
+            <a:schemeClr val="dk1"/>
+          </a:effectRef>
+          <a:fontRef idx="minor">
+            <a:schemeClr val="tx1"/>
+          </a:fontRef>
+        </p:style>
+      </p:cxnSp>
+      <p:cxnSp>
+        <p:nvCxnSpPr>
+          <p:cNvPr id="21" name="Straight Arrow Connector 20">
+            <a:extLst>
+              <a:ext uri="{FF2B5EF4-FFF2-40B4-BE49-F238E27FC236}">
+                <a16:creationId xmlns:a16="http://schemas.microsoft.com/office/drawing/2014/main" id="{05AB4852-12C3-E943-9ACE-449F104966AC}"/>
+              </a:ext>
+            </a:extLst>
+          </p:cNvPr>
+          <p:cNvCxnSpPr>
+            <a:cxnSpLocks/>
+            <a:stCxn id="3" idx="2"/>
+          </p:cNvCxnSpPr>
+          <p:nvPr/>
+        </p:nvCxnSpPr>
+        <p:spPr>
+          <a:xfrm>
+            <a:off x="5921829" y="970223"/>
+            <a:ext cx="4110444" cy="705396"/>
+          </a:xfrm>
+          <a:prstGeom prst="straightConnector1">
+            <a:avLst/>
+          </a:prstGeom>
+          <a:ln>
+            <a:tailEnd type="triangle"/>
+          </a:ln>
+        </p:spPr>
+        <p:style>
+          <a:lnRef idx="3">
+            <a:schemeClr val="dk1"/>
+          </a:lnRef>
+          <a:fillRef idx="0">
+            <a:schemeClr val="dk1"/>
+          </a:fillRef>
+          <a:effectRef idx="2">
+            <a:schemeClr val="dk1"/>
+          </a:effectRef>
+          <a:fontRef idx="minor">
+            <a:schemeClr val="tx1"/>
+          </a:fontRef>
+        </p:style>
+      </p:cxnSp>
+      <p:sp>
+        <p:nvSpPr>
+          <p:cNvPr id="24" name="TextBox 23">
+            <a:extLst>
+              <a:ext uri="{FF2B5EF4-FFF2-40B4-BE49-F238E27FC236}">
+                <a16:creationId xmlns:a16="http://schemas.microsoft.com/office/drawing/2014/main" id="{C3651B76-EF34-3746-9C4F-FF5F7B7B08B9}"/>
+              </a:ext>
+            </a:extLst>
+          </p:cNvPr>
+          <p:cNvSpPr txBox="1"/>
+          <p:nvPr/>
+        </p:nvSpPr>
+        <p:spPr>
+          <a:xfrm>
+            <a:off x="622664" y="4258490"/>
+            <a:ext cx="5107576" cy="923330"/>
+          </a:xfrm>
+          <a:prstGeom prst="rect">
+            <a:avLst/>
+          </a:prstGeom>
+          <a:noFill/>
+        </p:spPr>
+        <p:txBody>
+          <a:bodyPr wrap="square" rtlCol="0">
+            <a:spAutoFit/>
+          </a:bodyPr>
+          <a:lstStyle/>
+          <a:p>
+            <a:r>
+              <a:rPr lang="en-US" dirty="0"/>
+              <a:t>Import c1 from ‘./’</a:t>
+            </a:r>
+          </a:p>
+          <a:p>
+            <a:r>
+              <a:rPr lang="en-US" dirty="0"/>
+              <a:t>Import c2 from ‘./’</a:t>
+            </a:r>
+          </a:p>
+          <a:p>
+            <a:r>
+              <a:rPr lang="en-US" dirty="0"/>
+              <a:t>Import c3 from ‘./’</a:t>
+            </a:r>
+          </a:p>
+        </p:txBody>
+      </p:sp>
+    </p:spTree>
+    <p:extLst>
+      <p:ext uri="{BB962C8B-B14F-4D97-AF65-F5344CB8AC3E}">
+        <p14:creationId xmlns:p14="http://schemas.microsoft.com/office/powerpoint/2010/main" val="2445701055"/>
+      </p:ext>
+    </p:extLst>
+  </p:cSld>
+  <p:clrMapOvr>
+    <a:masterClrMapping/>
+  </p:clrMapOvr>
+</p:sld>
+</file>
+
+<file path=ppt/slides/slide45.xml><?xml version="1.0" encoding="utf-8"?>
+<p:sld xmlns:a="http://schemas.openxmlformats.org/drawingml/2006/main" xmlns:r="http://schemas.openxmlformats.org/officeDocument/2006/relationships" xmlns:p="http://schemas.openxmlformats.org/presentationml/2006/main">
+  <p:cSld>
+    <p:spTree>
+      <p:nvGrpSpPr>
+        <p:cNvPr id="1" name=""/>
+        <p:cNvGrpSpPr/>
+        <p:nvPr/>
+      </p:nvGrpSpPr>
+      <p:grpSpPr>
+        <a:xfrm>
+          <a:off x="0" y="0"/>
+          <a:ext cx="0" cy="0"/>
+          <a:chOff x="0" y="0"/>
+          <a:chExt cx="0" cy="0"/>
+        </a:xfrm>
+      </p:grpSpPr>
+      <p:sp>
+        <p:nvSpPr>
+          <p:cNvPr id="2" name="Cube 1">
+            <a:extLst>
+              <a:ext uri="{FF2B5EF4-FFF2-40B4-BE49-F238E27FC236}">
+                <a16:creationId xmlns:a16="http://schemas.microsoft.com/office/drawing/2014/main" id="{DB0BE93D-E5ED-3A4A-974C-C72E5720E504}"/>
+              </a:ext>
+            </a:extLst>
+          </p:cNvPr>
+          <p:cNvSpPr/>
+          <p:nvPr/>
+        </p:nvSpPr>
+        <p:spPr>
+          <a:xfrm>
+            <a:off x="3030583" y="783772"/>
+            <a:ext cx="3396343" cy="4598126"/>
+          </a:xfrm>
+          <a:prstGeom prst="cube">
+            <a:avLst>
+              <a:gd name="adj" fmla="val 11923"/>
+            </a:avLst>
+          </a:prstGeom>
+        </p:spPr>
+        <p:style>
+          <a:lnRef idx="2">
+            <a:schemeClr val="accent1">
+              <a:shade val="50000"/>
+            </a:schemeClr>
+          </a:lnRef>
+          <a:fillRef idx="1">
+            <a:schemeClr val="accent1"/>
+          </a:fillRef>
+          <a:effectRef idx="0">
+            <a:schemeClr val="accent1"/>
+          </a:effectRef>
+          <a:fontRef idx="minor">
+            <a:schemeClr val="lt1"/>
+          </a:fontRef>
+        </p:style>
+        <p:txBody>
+          <a:bodyPr rtlCol="0" anchor="ctr"/>
+          <a:lstStyle/>
+          <a:p>
+            <a:pPr algn="ctr"/>
+            <a:endParaRPr lang="en-US"/>
+          </a:p>
+        </p:txBody>
+      </p:sp>
+      <p:sp>
+        <p:nvSpPr>
+          <p:cNvPr id="4" name="Rectangle 3">
+            <a:extLst>
+              <a:ext uri="{FF2B5EF4-FFF2-40B4-BE49-F238E27FC236}">
+                <a16:creationId xmlns:a16="http://schemas.microsoft.com/office/drawing/2014/main" id="{856268B8-6871-6A40-A176-40EFC12F45B1}"/>
+              </a:ext>
+            </a:extLst>
+          </p:cNvPr>
+          <p:cNvSpPr/>
+          <p:nvPr/>
+        </p:nvSpPr>
+        <p:spPr>
+          <a:xfrm>
+            <a:off x="4319451" y="1193074"/>
+            <a:ext cx="313509" cy="4188824"/>
+          </a:xfrm>
+          <a:prstGeom prst="rect">
+            <a:avLst/>
+          </a:prstGeom>
+          <a:solidFill>
+            <a:schemeClr val="accent2"/>
+          </a:solidFill>
+        </p:spPr>
+        <p:style>
+          <a:lnRef idx="2">
+            <a:schemeClr val="accent1">
+              <a:shade val="50000"/>
+            </a:schemeClr>
+          </a:lnRef>
+          <a:fillRef idx="1">
+            <a:schemeClr val="accent1"/>
+          </a:fillRef>
+          <a:effectRef idx="0">
+            <a:schemeClr val="accent1"/>
+          </a:effectRef>
+          <a:fontRef idx="minor">
+            <a:schemeClr val="lt1"/>
+          </a:fontRef>
+        </p:style>
+        <p:txBody>
+          <a:bodyPr rtlCol="0" anchor="ctr"/>
+          <a:lstStyle/>
+          <a:p>
+            <a:pPr algn="ctr"/>
+            <a:endParaRPr lang="en-US"/>
+          </a:p>
+        </p:txBody>
+      </p:sp>
+      <p:sp>
+        <p:nvSpPr>
+          <p:cNvPr id="5" name="Rectangle 4">
+            <a:extLst>
+              <a:ext uri="{FF2B5EF4-FFF2-40B4-BE49-F238E27FC236}">
+                <a16:creationId xmlns:a16="http://schemas.microsoft.com/office/drawing/2014/main" id="{CE8F6C7D-D1D9-834E-B565-E611CBB4DA21}"/>
+              </a:ext>
+            </a:extLst>
+          </p:cNvPr>
+          <p:cNvSpPr/>
+          <p:nvPr/>
+        </p:nvSpPr>
+        <p:spPr>
+          <a:xfrm>
+            <a:off x="3030583" y="1907177"/>
+            <a:ext cx="2978331" cy="235132"/>
+          </a:xfrm>
+          <a:prstGeom prst="rect">
+            <a:avLst/>
+          </a:prstGeom>
+          <a:solidFill>
+            <a:schemeClr val="accent2"/>
+          </a:solidFill>
+        </p:spPr>
+        <p:style>
+          <a:lnRef idx="2">
+            <a:schemeClr val="accent1">
+              <a:shade val="50000"/>
+            </a:schemeClr>
+          </a:lnRef>
+          <a:fillRef idx="1">
+            <a:schemeClr val="accent1"/>
+          </a:fillRef>
+          <a:effectRef idx="0">
+            <a:schemeClr val="accent1"/>
+          </a:effectRef>
+          <a:fontRef idx="minor">
+            <a:schemeClr val="lt1"/>
+          </a:fontRef>
+        </p:style>
+        <p:txBody>
+          <a:bodyPr rtlCol="0" anchor="ctr"/>
+          <a:lstStyle/>
+          <a:p>
+            <a:pPr algn="ctr"/>
+            <a:endParaRPr lang="en-US"/>
+          </a:p>
+        </p:txBody>
+      </p:sp>
+      <p:sp>
+        <p:nvSpPr>
+          <p:cNvPr id="6" name="TextBox 5">
+            <a:extLst>
+              <a:ext uri="{FF2B5EF4-FFF2-40B4-BE49-F238E27FC236}">
+                <a16:creationId xmlns:a16="http://schemas.microsoft.com/office/drawing/2014/main" id="{A2CC28E7-FD0A-7E4B-8A8E-5141C2F3EFA9}"/>
+              </a:ext>
+            </a:extLst>
+          </p:cNvPr>
+          <p:cNvSpPr txBox="1"/>
+          <p:nvPr/>
+        </p:nvSpPr>
+        <p:spPr>
+          <a:xfrm>
+            <a:off x="3152503" y="1341120"/>
+            <a:ext cx="1027611" cy="369332"/>
+          </a:xfrm>
+          <a:prstGeom prst="rect">
+            <a:avLst/>
+          </a:prstGeom>
+          <a:noFill/>
+        </p:spPr>
+        <p:txBody>
+          <a:bodyPr wrap="square" rtlCol="0">
+            <a:spAutoFit/>
+          </a:bodyPr>
+          <a:lstStyle/>
+          <a:p>
+            <a:r>
+              <a:rPr lang="en-US" dirty="0">
+                <a:solidFill>
+                  <a:srgbClr val="FFFF00"/>
+                </a:solidFill>
+              </a:rPr>
+              <a:t>path</a:t>
+            </a:r>
+          </a:p>
+        </p:txBody>
+      </p:sp>
+      <p:sp>
+        <p:nvSpPr>
+          <p:cNvPr id="7" name="TextBox 6">
+            <a:extLst>
+              <a:ext uri="{FF2B5EF4-FFF2-40B4-BE49-F238E27FC236}">
+                <a16:creationId xmlns:a16="http://schemas.microsoft.com/office/drawing/2014/main" id="{0267A53E-1CC6-4C44-8C51-E9497ED54549}"/>
+              </a:ext>
+            </a:extLst>
+          </p:cNvPr>
+          <p:cNvSpPr txBox="1"/>
+          <p:nvPr/>
+        </p:nvSpPr>
+        <p:spPr>
+          <a:xfrm>
+            <a:off x="4693920" y="1341120"/>
+            <a:ext cx="1271451" cy="369332"/>
+          </a:xfrm>
+          <a:prstGeom prst="rect">
+            <a:avLst/>
+          </a:prstGeom>
+          <a:noFill/>
+        </p:spPr>
+        <p:txBody>
+          <a:bodyPr wrap="square" rtlCol="0">
+            <a:spAutoFit/>
+          </a:bodyPr>
+          <a:lstStyle/>
+          <a:p>
+            <a:r>
+              <a:rPr lang="en-US" dirty="0">
+                <a:solidFill>
+                  <a:srgbClr val="FFFF00"/>
+                </a:solidFill>
+              </a:rPr>
+              <a:t>component</a:t>
+            </a:r>
+          </a:p>
+        </p:txBody>
+      </p:sp>
+      <p:sp>
+        <p:nvSpPr>
+          <p:cNvPr id="8" name="Rectangle 7">
+            <a:extLst>
+              <a:ext uri="{FF2B5EF4-FFF2-40B4-BE49-F238E27FC236}">
+                <a16:creationId xmlns:a16="http://schemas.microsoft.com/office/drawing/2014/main" id="{595B4EB4-E70F-BD40-9CB7-C63A17243563}"/>
+              </a:ext>
+            </a:extLst>
+          </p:cNvPr>
+          <p:cNvSpPr/>
+          <p:nvPr/>
+        </p:nvSpPr>
+        <p:spPr>
+          <a:xfrm>
+            <a:off x="3030583" y="2856412"/>
+            <a:ext cx="2978331" cy="235132"/>
+          </a:xfrm>
+          <a:prstGeom prst="rect">
+            <a:avLst/>
+          </a:prstGeom>
+          <a:solidFill>
+            <a:schemeClr val="accent2"/>
+          </a:solidFill>
+        </p:spPr>
+        <p:style>
+          <a:lnRef idx="2">
+            <a:schemeClr val="accent1">
+              <a:shade val="50000"/>
+            </a:schemeClr>
+          </a:lnRef>
+          <a:fillRef idx="1">
+            <a:schemeClr val="accent1"/>
+          </a:fillRef>
+          <a:effectRef idx="0">
+            <a:schemeClr val="accent1"/>
+          </a:effectRef>
+          <a:fontRef idx="minor">
+            <a:schemeClr val="lt1"/>
+          </a:fontRef>
+        </p:style>
+        <p:txBody>
+          <a:bodyPr rtlCol="0" anchor="ctr"/>
+          <a:lstStyle/>
+          <a:p>
+            <a:pPr algn="ctr"/>
+            <a:endParaRPr lang="en-US"/>
+          </a:p>
+        </p:txBody>
+      </p:sp>
+      <p:sp>
+        <p:nvSpPr>
+          <p:cNvPr id="9" name="TextBox 8">
+            <a:extLst>
+              <a:ext uri="{FF2B5EF4-FFF2-40B4-BE49-F238E27FC236}">
+                <a16:creationId xmlns:a16="http://schemas.microsoft.com/office/drawing/2014/main" id="{0019DB63-E64B-3B40-B6B1-0C04AEBD9F4A}"/>
+              </a:ext>
+            </a:extLst>
+          </p:cNvPr>
+          <p:cNvSpPr txBox="1"/>
+          <p:nvPr/>
+        </p:nvSpPr>
+        <p:spPr>
+          <a:xfrm>
+            <a:off x="3152503" y="2290355"/>
+            <a:ext cx="1027611" cy="369332"/>
+          </a:xfrm>
+          <a:prstGeom prst="rect">
+            <a:avLst/>
+          </a:prstGeom>
+          <a:noFill/>
+        </p:spPr>
+        <p:txBody>
+          <a:bodyPr wrap="square" rtlCol="0">
+            <a:spAutoFit/>
+          </a:bodyPr>
+          <a:lstStyle/>
+          <a:p>
+            <a:r>
+              <a:rPr lang="en-US" dirty="0">
+                <a:solidFill>
+                  <a:srgbClr val="FFFF00"/>
+                </a:solidFill>
+              </a:rPr>
+              <a:t>path</a:t>
+            </a:r>
+          </a:p>
+        </p:txBody>
+      </p:sp>
+      <p:sp>
+        <p:nvSpPr>
+          <p:cNvPr id="10" name="TextBox 9">
+            <a:extLst>
+              <a:ext uri="{FF2B5EF4-FFF2-40B4-BE49-F238E27FC236}">
+                <a16:creationId xmlns:a16="http://schemas.microsoft.com/office/drawing/2014/main" id="{576D2787-03A8-B144-AFB3-4F69BEBC77A7}"/>
+              </a:ext>
+            </a:extLst>
+          </p:cNvPr>
+          <p:cNvSpPr txBox="1"/>
+          <p:nvPr/>
+        </p:nvSpPr>
+        <p:spPr>
+          <a:xfrm>
+            <a:off x="4693920" y="2290355"/>
+            <a:ext cx="1271451" cy="369332"/>
+          </a:xfrm>
+          <a:prstGeom prst="rect">
+            <a:avLst/>
+          </a:prstGeom>
+          <a:noFill/>
+        </p:spPr>
+        <p:txBody>
+          <a:bodyPr wrap="square" rtlCol="0">
+            <a:spAutoFit/>
+          </a:bodyPr>
+          <a:lstStyle/>
+          <a:p>
+            <a:r>
+              <a:rPr lang="en-US" dirty="0">
+                <a:solidFill>
+                  <a:srgbClr val="FFFF00"/>
+                </a:solidFill>
+              </a:rPr>
+              <a:t>component</a:t>
+            </a:r>
+          </a:p>
+        </p:txBody>
+      </p:sp>
+      <p:sp>
+        <p:nvSpPr>
+          <p:cNvPr id="11" name="Rectangle 10">
+            <a:extLst>
+              <a:ext uri="{FF2B5EF4-FFF2-40B4-BE49-F238E27FC236}">
+                <a16:creationId xmlns:a16="http://schemas.microsoft.com/office/drawing/2014/main" id="{2AB1A6DF-C118-D74A-BFF0-9B50BD033CEA}"/>
+              </a:ext>
+            </a:extLst>
+          </p:cNvPr>
+          <p:cNvSpPr/>
+          <p:nvPr/>
+        </p:nvSpPr>
+        <p:spPr>
+          <a:xfrm>
+            <a:off x="3030583" y="3718560"/>
+            <a:ext cx="2978331" cy="235132"/>
+          </a:xfrm>
+          <a:prstGeom prst="rect">
+            <a:avLst/>
+          </a:prstGeom>
+          <a:solidFill>
+            <a:schemeClr val="accent2"/>
+          </a:solidFill>
+        </p:spPr>
+        <p:style>
+          <a:lnRef idx="2">
+            <a:schemeClr val="accent1">
+              <a:shade val="50000"/>
+            </a:schemeClr>
+          </a:lnRef>
+          <a:fillRef idx="1">
+            <a:schemeClr val="accent1"/>
+          </a:fillRef>
+          <a:effectRef idx="0">
+            <a:schemeClr val="accent1"/>
+          </a:effectRef>
+          <a:fontRef idx="minor">
+            <a:schemeClr val="lt1"/>
+          </a:fontRef>
+        </p:style>
+        <p:txBody>
+          <a:bodyPr rtlCol="0" anchor="ctr"/>
+          <a:lstStyle/>
+          <a:p>
+            <a:pPr algn="ctr"/>
+            <a:endParaRPr lang="en-US"/>
+          </a:p>
+        </p:txBody>
+      </p:sp>
+      <p:sp>
+        <p:nvSpPr>
+          <p:cNvPr id="12" name="TextBox 11">
+            <a:extLst>
+              <a:ext uri="{FF2B5EF4-FFF2-40B4-BE49-F238E27FC236}">
+                <a16:creationId xmlns:a16="http://schemas.microsoft.com/office/drawing/2014/main" id="{73318E2D-B337-F645-984C-6550B1FC7FFA}"/>
+              </a:ext>
+            </a:extLst>
+          </p:cNvPr>
+          <p:cNvSpPr txBox="1"/>
+          <p:nvPr/>
+        </p:nvSpPr>
+        <p:spPr>
+          <a:xfrm>
+            <a:off x="3152503" y="3152503"/>
+            <a:ext cx="1027611" cy="369332"/>
+          </a:xfrm>
+          <a:prstGeom prst="rect">
+            <a:avLst/>
+          </a:prstGeom>
+          <a:noFill/>
+        </p:spPr>
+        <p:txBody>
+          <a:bodyPr wrap="square" rtlCol="0">
+            <a:spAutoFit/>
+          </a:bodyPr>
+          <a:lstStyle/>
+          <a:p>
+            <a:r>
+              <a:rPr lang="en-US" dirty="0">
+                <a:solidFill>
+                  <a:srgbClr val="FFFF00"/>
+                </a:solidFill>
+              </a:rPr>
+              <a:t>path</a:t>
+            </a:r>
+          </a:p>
+        </p:txBody>
+      </p:sp>
+      <p:sp>
+        <p:nvSpPr>
+          <p:cNvPr id="13" name="TextBox 12">
+            <a:extLst>
+              <a:ext uri="{FF2B5EF4-FFF2-40B4-BE49-F238E27FC236}">
+                <a16:creationId xmlns:a16="http://schemas.microsoft.com/office/drawing/2014/main" id="{F4558094-7955-754B-8497-86C8DAE3860E}"/>
+              </a:ext>
+            </a:extLst>
+          </p:cNvPr>
+          <p:cNvSpPr txBox="1"/>
+          <p:nvPr/>
+        </p:nvSpPr>
+        <p:spPr>
+          <a:xfrm>
+            <a:off x="4693920" y="3152503"/>
+            <a:ext cx="1271451" cy="369332"/>
+          </a:xfrm>
+          <a:prstGeom prst="rect">
+            <a:avLst/>
+          </a:prstGeom>
+          <a:noFill/>
+        </p:spPr>
+        <p:txBody>
+          <a:bodyPr wrap="square" rtlCol="0">
+            <a:spAutoFit/>
+          </a:bodyPr>
+          <a:lstStyle/>
+          <a:p>
+            <a:r>
+              <a:rPr lang="en-US" dirty="0">
+                <a:solidFill>
+                  <a:srgbClr val="FFFF00"/>
+                </a:solidFill>
+              </a:rPr>
+              <a:t>component</a:t>
+            </a:r>
+          </a:p>
+        </p:txBody>
+      </p:sp>
+      <p:sp>
+        <p:nvSpPr>
+          <p:cNvPr id="14" name="Rectangle 13">
+            <a:extLst>
+              <a:ext uri="{FF2B5EF4-FFF2-40B4-BE49-F238E27FC236}">
+                <a16:creationId xmlns:a16="http://schemas.microsoft.com/office/drawing/2014/main" id="{1FFB4CBE-CDE9-5A4C-8049-45915D48ECE2}"/>
+              </a:ext>
+            </a:extLst>
+          </p:cNvPr>
+          <p:cNvSpPr/>
+          <p:nvPr/>
+        </p:nvSpPr>
+        <p:spPr>
+          <a:xfrm>
+            <a:off x="3030583" y="4519749"/>
+            <a:ext cx="2978331" cy="235132"/>
+          </a:xfrm>
+          <a:prstGeom prst="rect">
+            <a:avLst/>
+          </a:prstGeom>
+          <a:solidFill>
+            <a:schemeClr val="accent2"/>
+          </a:solidFill>
+        </p:spPr>
+        <p:style>
+          <a:lnRef idx="2">
+            <a:schemeClr val="accent1">
+              <a:shade val="50000"/>
+            </a:schemeClr>
+          </a:lnRef>
+          <a:fillRef idx="1">
+            <a:schemeClr val="accent1"/>
+          </a:fillRef>
+          <a:effectRef idx="0">
+            <a:schemeClr val="accent1"/>
+          </a:effectRef>
+          <a:fontRef idx="minor">
+            <a:schemeClr val="lt1"/>
+          </a:fontRef>
+        </p:style>
+        <p:txBody>
+          <a:bodyPr rtlCol="0" anchor="ctr"/>
+          <a:lstStyle/>
+          <a:p>
+            <a:pPr algn="ctr"/>
+            <a:endParaRPr lang="en-US"/>
+          </a:p>
+        </p:txBody>
+      </p:sp>
+      <p:sp>
+        <p:nvSpPr>
+          <p:cNvPr id="15" name="TextBox 14">
+            <a:extLst>
+              <a:ext uri="{FF2B5EF4-FFF2-40B4-BE49-F238E27FC236}">
+                <a16:creationId xmlns:a16="http://schemas.microsoft.com/office/drawing/2014/main" id="{30737999-D10D-A240-B346-87B1E99F0D98}"/>
+              </a:ext>
+            </a:extLst>
+          </p:cNvPr>
+          <p:cNvSpPr txBox="1"/>
+          <p:nvPr/>
+        </p:nvSpPr>
+        <p:spPr>
+          <a:xfrm>
+            <a:off x="3152503" y="3953692"/>
+            <a:ext cx="1027611" cy="369332"/>
+          </a:xfrm>
+          <a:prstGeom prst="rect">
+            <a:avLst/>
+          </a:prstGeom>
+          <a:noFill/>
+        </p:spPr>
+        <p:txBody>
+          <a:bodyPr wrap="square" rtlCol="0">
+            <a:spAutoFit/>
+          </a:bodyPr>
+          <a:lstStyle/>
+          <a:p>
+            <a:r>
+              <a:rPr lang="en-US" dirty="0">
+                <a:solidFill>
+                  <a:srgbClr val="FFFF00"/>
+                </a:solidFill>
+              </a:rPr>
+              <a:t>path</a:t>
+            </a:r>
+          </a:p>
+        </p:txBody>
+      </p:sp>
+      <p:sp>
+        <p:nvSpPr>
+          <p:cNvPr id="16" name="TextBox 15">
+            <a:extLst>
+              <a:ext uri="{FF2B5EF4-FFF2-40B4-BE49-F238E27FC236}">
+                <a16:creationId xmlns:a16="http://schemas.microsoft.com/office/drawing/2014/main" id="{A657CAE7-04E4-A648-A417-F9D8E095A384}"/>
+              </a:ext>
+            </a:extLst>
+          </p:cNvPr>
+          <p:cNvSpPr txBox="1"/>
+          <p:nvPr/>
+        </p:nvSpPr>
+        <p:spPr>
+          <a:xfrm>
+            <a:off x="4693920" y="3953692"/>
+            <a:ext cx="1271451" cy="369332"/>
+          </a:xfrm>
+          <a:prstGeom prst="rect">
+            <a:avLst/>
+          </a:prstGeom>
+          <a:noFill/>
+        </p:spPr>
+        <p:txBody>
+          <a:bodyPr wrap="square" rtlCol="0">
+            <a:spAutoFit/>
+          </a:bodyPr>
+          <a:lstStyle/>
+          <a:p>
+            <a:r>
+              <a:rPr lang="en-US" dirty="0">
+                <a:solidFill>
+                  <a:srgbClr val="FFFF00"/>
+                </a:solidFill>
+              </a:rPr>
+              <a:t>component</a:t>
+            </a:r>
+          </a:p>
+        </p:txBody>
+      </p:sp>
+      <p:sp>
+        <p:nvSpPr>
+          <p:cNvPr id="17" name="TextBox 16">
+            <a:extLst>
+              <a:ext uri="{FF2B5EF4-FFF2-40B4-BE49-F238E27FC236}">
+                <a16:creationId xmlns:a16="http://schemas.microsoft.com/office/drawing/2014/main" id="{C821929D-E876-6D46-8705-0F4F597D9F72}"/>
+              </a:ext>
+            </a:extLst>
+          </p:cNvPr>
+          <p:cNvSpPr txBox="1"/>
+          <p:nvPr/>
+        </p:nvSpPr>
+        <p:spPr>
+          <a:xfrm>
+            <a:off x="3004457" y="4806129"/>
+            <a:ext cx="1027611" cy="369332"/>
+          </a:xfrm>
+          <a:prstGeom prst="rect">
+            <a:avLst/>
+          </a:prstGeom>
+          <a:noFill/>
+        </p:spPr>
+        <p:txBody>
+          <a:bodyPr wrap="square" rtlCol="0">
+            <a:spAutoFit/>
+          </a:bodyPr>
+          <a:lstStyle/>
+          <a:p>
+            <a:r>
+              <a:rPr lang="en-US" dirty="0">
+                <a:solidFill>
+                  <a:srgbClr val="FFFF00"/>
+                </a:solidFill>
+              </a:rPr>
+              <a:t>path</a:t>
+            </a:r>
+          </a:p>
+        </p:txBody>
+      </p:sp>
+      <p:sp>
+        <p:nvSpPr>
+          <p:cNvPr id="18" name="TextBox 17">
+            <a:extLst>
+              <a:ext uri="{FF2B5EF4-FFF2-40B4-BE49-F238E27FC236}">
+                <a16:creationId xmlns:a16="http://schemas.microsoft.com/office/drawing/2014/main" id="{2AAF7981-6077-434A-A988-ED2D9678EFAB}"/>
+              </a:ext>
+            </a:extLst>
+          </p:cNvPr>
+          <p:cNvSpPr txBox="1"/>
+          <p:nvPr/>
+        </p:nvSpPr>
+        <p:spPr>
+          <a:xfrm>
+            <a:off x="4545874" y="4806129"/>
+            <a:ext cx="1271451" cy="369332"/>
+          </a:xfrm>
+          <a:prstGeom prst="rect">
+            <a:avLst/>
+          </a:prstGeom>
+          <a:noFill/>
+        </p:spPr>
+        <p:txBody>
+          <a:bodyPr wrap="square" rtlCol="0">
+            <a:spAutoFit/>
+          </a:bodyPr>
+          <a:lstStyle/>
+          <a:p>
+            <a:r>
+              <a:rPr lang="en-US" dirty="0">
+                <a:solidFill>
+                  <a:srgbClr val="FFFF00"/>
+                </a:solidFill>
+              </a:rPr>
+              <a:t>component</a:t>
+            </a:r>
+          </a:p>
+        </p:txBody>
+      </p:sp>
+      <p:sp>
+        <p:nvSpPr>
+          <p:cNvPr id="19" name="TextBox 18">
+            <a:extLst>
+              <a:ext uri="{FF2B5EF4-FFF2-40B4-BE49-F238E27FC236}">
+                <a16:creationId xmlns:a16="http://schemas.microsoft.com/office/drawing/2014/main" id="{AFF8977E-27C0-4E45-BD83-18877AA6D984}"/>
+              </a:ext>
+            </a:extLst>
+          </p:cNvPr>
+          <p:cNvSpPr txBox="1"/>
+          <p:nvPr/>
+        </p:nvSpPr>
+        <p:spPr>
+          <a:xfrm>
+            <a:off x="513806" y="182880"/>
+            <a:ext cx="2281645" cy="369332"/>
+          </a:xfrm>
+          <a:prstGeom prst="rect">
+            <a:avLst/>
+          </a:prstGeom>
+          <a:noFill/>
+        </p:spPr>
+        <p:txBody>
+          <a:bodyPr wrap="square" rtlCol="0">
+            <a:spAutoFit/>
+          </a:bodyPr>
+          <a:lstStyle/>
+          <a:p>
+            <a:r>
+              <a:rPr lang="en-US" dirty="0"/>
+              <a:t>Route Dictionary</a:t>
+            </a:r>
+          </a:p>
+        </p:txBody>
+      </p:sp>
+      <p:sp>
+        <p:nvSpPr>
+          <p:cNvPr id="20" name="Curved Left Arrow 19">
+            <a:extLst>
+              <a:ext uri="{FF2B5EF4-FFF2-40B4-BE49-F238E27FC236}">
+                <a16:creationId xmlns:a16="http://schemas.microsoft.com/office/drawing/2014/main" id="{E228B521-DF01-4A4F-AA15-A6D318E0B2E6}"/>
+              </a:ext>
+            </a:extLst>
+          </p:cNvPr>
+          <p:cNvSpPr/>
+          <p:nvPr/>
+        </p:nvSpPr>
+        <p:spPr>
+          <a:xfrm>
+            <a:off x="6096000" y="1454331"/>
+            <a:ext cx="574766" cy="1123406"/>
+          </a:xfrm>
+          <a:prstGeom prst="curvedLeftArrow">
+            <a:avLst/>
+          </a:prstGeom>
+          <a:solidFill>
+            <a:srgbClr val="FFFF00"/>
+          </a:solidFill>
+        </p:spPr>
+        <p:style>
+          <a:lnRef idx="2">
+            <a:schemeClr val="accent1">
+              <a:shade val="50000"/>
+            </a:schemeClr>
+          </a:lnRef>
+          <a:fillRef idx="1">
+            <a:schemeClr val="accent1"/>
+          </a:fillRef>
+          <a:effectRef idx="0">
+            <a:schemeClr val="accent1"/>
+          </a:effectRef>
+          <a:fontRef idx="minor">
+            <a:schemeClr val="lt1"/>
+          </a:fontRef>
+        </p:style>
+        <p:txBody>
+          <a:bodyPr rtlCol="0" anchor="ctr"/>
+          <a:lstStyle/>
+          <a:p>
+            <a:pPr algn="ctr"/>
+            <a:endParaRPr lang="en-US">
+              <a:solidFill>
+                <a:schemeClr val="tx1"/>
+              </a:solidFill>
+            </a:endParaRPr>
+          </a:p>
+        </p:txBody>
+      </p:sp>
+      <p:sp>
+        <p:nvSpPr>
+          <p:cNvPr id="21" name="Curved Left Arrow 20">
+            <a:extLst>
+              <a:ext uri="{FF2B5EF4-FFF2-40B4-BE49-F238E27FC236}">
+                <a16:creationId xmlns:a16="http://schemas.microsoft.com/office/drawing/2014/main" id="{EF20A115-FFE8-CB42-A951-DD8BC415D540}"/>
+              </a:ext>
+            </a:extLst>
+          </p:cNvPr>
+          <p:cNvSpPr/>
+          <p:nvPr/>
+        </p:nvSpPr>
+        <p:spPr>
+          <a:xfrm>
+            <a:off x="6148251" y="2659687"/>
+            <a:ext cx="574766" cy="1123406"/>
+          </a:xfrm>
+          <a:prstGeom prst="curvedLeftArrow">
+            <a:avLst/>
+          </a:prstGeom>
+          <a:solidFill>
+            <a:srgbClr val="FFFF00"/>
+          </a:solidFill>
+        </p:spPr>
+        <p:style>
+          <a:lnRef idx="2">
+            <a:schemeClr val="accent1">
+              <a:shade val="50000"/>
+            </a:schemeClr>
+          </a:lnRef>
+          <a:fillRef idx="1">
+            <a:schemeClr val="accent1"/>
+          </a:fillRef>
+          <a:effectRef idx="0">
+            <a:schemeClr val="accent1"/>
+          </a:effectRef>
+          <a:fontRef idx="minor">
+            <a:schemeClr val="lt1"/>
+          </a:fontRef>
+        </p:style>
+        <p:txBody>
+          <a:bodyPr rtlCol="0" anchor="ctr"/>
+          <a:lstStyle/>
+          <a:p>
+            <a:pPr algn="ctr"/>
+            <a:endParaRPr lang="en-US">
+              <a:solidFill>
+                <a:schemeClr val="tx1"/>
+              </a:solidFill>
+            </a:endParaRPr>
+          </a:p>
+        </p:txBody>
+      </p:sp>
+      <p:sp>
+        <p:nvSpPr>
+          <p:cNvPr id="22" name="Curved Left Arrow 21">
+            <a:extLst>
+              <a:ext uri="{FF2B5EF4-FFF2-40B4-BE49-F238E27FC236}">
+                <a16:creationId xmlns:a16="http://schemas.microsoft.com/office/drawing/2014/main" id="{A10B2F0A-049D-1D49-8AC7-60F629F4B961}"/>
+              </a:ext>
+            </a:extLst>
+          </p:cNvPr>
+          <p:cNvSpPr/>
+          <p:nvPr/>
+        </p:nvSpPr>
+        <p:spPr>
+          <a:xfrm>
+            <a:off x="6122125" y="4020792"/>
+            <a:ext cx="574766" cy="1123406"/>
+          </a:xfrm>
+          <a:prstGeom prst="curvedLeftArrow">
+            <a:avLst/>
+          </a:prstGeom>
+          <a:solidFill>
+            <a:srgbClr val="FFFF00"/>
+          </a:solidFill>
+        </p:spPr>
+        <p:style>
+          <a:lnRef idx="2">
+            <a:schemeClr val="accent1">
+              <a:shade val="50000"/>
+            </a:schemeClr>
+          </a:lnRef>
+          <a:fillRef idx="1">
+            <a:schemeClr val="accent1"/>
+          </a:fillRef>
+          <a:effectRef idx="0">
+            <a:schemeClr val="accent1"/>
+          </a:effectRef>
+          <a:fontRef idx="minor">
+            <a:schemeClr val="lt1"/>
+          </a:fontRef>
+        </p:style>
+        <p:txBody>
+          <a:bodyPr rtlCol="0" anchor="ctr"/>
+          <a:lstStyle/>
+          <a:p>
+            <a:pPr algn="ctr"/>
+            <a:endParaRPr lang="en-US">
+              <a:solidFill>
+                <a:schemeClr val="tx1"/>
+              </a:solidFill>
+            </a:endParaRPr>
+          </a:p>
+        </p:txBody>
+      </p:sp>
+      <p:sp>
+        <p:nvSpPr>
+          <p:cNvPr id="23" name="TextBox 22">
+            <a:extLst>
+              <a:ext uri="{FF2B5EF4-FFF2-40B4-BE49-F238E27FC236}">
+                <a16:creationId xmlns:a16="http://schemas.microsoft.com/office/drawing/2014/main" id="{505B89CE-F43A-2644-A951-64D31E64A2F8}"/>
+              </a:ext>
+            </a:extLst>
+          </p:cNvPr>
+          <p:cNvSpPr txBox="1"/>
+          <p:nvPr/>
+        </p:nvSpPr>
+        <p:spPr>
+          <a:xfrm>
+            <a:off x="7524206" y="1193074"/>
+            <a:ext cx="4101737" cy="1754326"/>
+          </a:xfrm>
+          <a:prstGeom prst="rect">
+            <a:avLst/>
+          </a:prstGeom>
+          <a:noFill/>
+        </p:spPr>
+        <p:txBody>
+          <a:bodyPr wrap="square" rtlCol="0">
+            <a:spAutoFit/>
+          </a:bodyPr>
+          <a:lstStyle/>
+          <a:p>
+            <a:r>
+              <a:rPr lang="en-US" dirty="0"/>
+              <a:t>History: </a:t>
+            </a:r>
+            <a:r>
+              <a:rPr lang="en-US" dirty="0" err="1"/>
+              <a:t>Obejct</a:t>
+            </a:r>
+            <a:r>
+              <a:rPr lang="en-US" dirty="0"/>
+              <a:t> that contains the previous Routing </a:t>
+            </a:r>
+            <a:r>
+              <a:rPr lang="en-US" dirty="0" err="1"/>
+              <a:t>path:component</a:t>
+            </a:r>
+            <a:r>
+              <a:rPr lang="en-US" dirty="0"/>
+              <a:t> pair by default.</a:t>
+            </a:r>
+          </a:p>
+          <a:p>
+            <a:r>
+              <a:rPr lang="en-US" dirty="0"/>
+              <a:t>Also the explicitly the history object can be pushed with the target navigable </a:t>
+            </a:r>
+            <a:r>
+              <a:rPr lang="en-US" dirty="0" err="1"/>
+              <a:t>path:component</a:t>
+            </a:r>
+            <a:r>
+              <a:rPr lang="en-US" dirty="0"/>
+              <a:t> pair for custom or event based routing</a:t>
+            </a:r>
+          </a:p>
+        </p:txBody>
+      </p:sp>
+      <p:sp>
+        <p:nvSpPr>
+          <p:cNvPr id="24" name="Curved Right Arrow 23">
+            <a:extLst>
+              <a:ext uri="{FF2B5EF4-FFF2-40B4-BE49-F238E27FC236}">
+                <a16:creationId xmlns:a16="http://schemas.microsoft.com/office/drawing/2014/main" id="{D5855A49-44D9-814C-AA81-CABD384FEEAD}"/>
+              </a:ext>
+            </a:extLst>
+          </p:cNvPr>
+          <p:cNvSpPr/>
+          <p:nvPr/>
+        </p:nvSpPr>
+        <p:spPr>
+          <a:xfrm>
+            <a:off x="1968138" y="2290355"/>
+            <a:ext cx="1001485" cy="2853843"/>
+          </a:xfrm>
+          <a:prstGeom prst="curvedRightArrow">
+            <a:avLst/>
+          </a:prstGeom>
+          <a:solidFill>
+            <a:srgbClr val="FFFF00"/>
+          </a:solidFill>
+        </p:spPr>
+        <p:style>
+          <a:lnRef idx="2">
+            <a:schemeClr val="accent1">
+              <a:shade val="50000"/>
+            </a:schemeClr>
+          </a:lnRef>
+          <a:fillRef idx="1">
+            <a:schemeClr val="accent1"/>
+          </a:fillRef>
+          <a:effectRef idx="0">
+            <a:schemeClr val="accent1"/>
+          </a:effectRef>
+          <a:fontRef idx="minor">
+            <a:schemeClr val="lt1"/>
+          </a:fontRef>
+        </p:style>
+        <p:txBody>
+          <a:bodyPr rtlCol="0" anchor="ctr"/>
+          <a:lstStyle/>
+          <a:p>
+            <a:pPr algn="ctr"/>
+            <a:endParaRPr lang="en-US">
+              <a:solidFill>
+                <a:schemeClr val="tx1"/>
+              </a:solidFill>
+            </a:endParaRPr>
+          </a:p>
+        </p:txBody>
+      </p:sp>
+      <p:sp>
+        <p:nvSpPr>
+          <p:cNvPr id="25" name="TextBox 24">
+            <a:extLst>
+              <a:ext uri="{FF2B5EF4-FFF2-40B4-BE49-F238E27FC236}">
+                <a16:creationId xmlns:a16="http://schemas.microsoft.com/office/drawing/2014/main" id="{815C1622-807C-674B-9C42-E1465A66D91F}"/>
+              </a:ext>
+            </a:extLst>
+          </p:cNvPr>
+          <p:cNvSpPr txBox="1"/>
+          <p:nvPr/>
+        </p:nvSpPr>
+        <p:spPr>
+          <a:xfrm>
+            <a:off x="121920" y="5860869"/>
+            <a:ext cx="3396342" cy="646331"/>
+          </a:xfrm>
+          <a:prstGeom prst="rect">
+            <a:avLst/>
+          </a:prstGeom>
+          <a:noFill/>
+        </p:spPr>
+        <p:txBody>
+          <a:bodyPr wrap="square" rtlCol="0">
+            <a:spAutoFit/>
+          </a:bodyPr>
+          <a:lstStyle/>
+          <a:p>
+            <a:r>
+              <a:rPr lang="en-US" dirty="0" err="1"/>
+              <a:t>Props.history.push</a:t>
+            </a:r>
+            <a:r>
+              <a:rPr lang="en-US" dirty="0"/>
+              <a:t>(path)</a:t>
+            </a:r>
+          </a:p>
+          <a:p>
+            <a:r>
+              <a:rPr lang="en-US" dirty="0"/>
+              <a:t>For conditional navigation</a:t>
+            </a:r>
+          </a:p>
+        </p:txBody>
+      </p:sp>
+      <p:cxnSp>
+        <p:nvCxnSpPr>
+          <p:cNvPr id="27" name="Straight Arrow Connector 26">
+            <a:extLst>
+              <a:ext uri="{FF2B5EF4-FFF2-40B4-BE49-F238E27FC236}">
+                <a16:creationId xmlns:a16="http://schemas.microsoft.com/office/drawing/2014/main" id="{4455EA77-9700-AC4F-9B6F-48D1245013AD}"/>
+              </a:ext>
+            </a:extLst>
+          </p:cNvPr>
+          <p:cNvCxnSpPr>
+            <a:stCxn id="25" idx="0"/>
+          </p:cNvCxnSpPr>
+          <p:nvPr/>
+        </p:nvCxnSpPr>
+        <p:spPr>
+          <a:xfrm flipV="1">
+            <a:off x="1820091" y="4637315"/>
+            <a:ext cx="374469" cy="1223554"/>
+          </a:xfrm>
+          <a:prstGeom prst="straightConnector1">
+            <a:avLst/>
+          </a:prstGeom>
+          <a:ln>
+            <a:tailEnd type="triangle"/>
+          </a:ln>
+        </p:spPr>
+        <p:style>
+          <a:lnRef idx="1">
+            <a:schemeClr val="accent1"/>
+          </a:lnRef>
+          <a:fillRef idx="0">
+            <a:schemeClr val="accent1"/>
+          </a:fillRef>
+          <a:effectRef idx="0">
+            <a:schemeClr val="accent1"/>
+          </a:effectRef>
+          <a:fontRef idx="minor">
+            <a:schemeClr val="tx1"/>
+          </a:fontRef>
+        </p:style>
+      </p:cxnSp>
+    </p:spTree>
+    <p:extLst>
+      <p:ext uri="{BB962C8B-B14F-4D97-AF65-F5344CB8AC3E}">
+        <p14:creationId xmlns:p14="http://schemas.microsoft.com/office/powerpoint/2010/main" val="3905157654"/>
+      </p:ext>
+    </p:extLst>
+  </p:cSld>
+  <p:clrMapOvr>
+    <a:masterClrMapping/>
+  </p:clrMapOvr>
+</p:sld>
+</file>
+
 <file path=ppt/slides/slide5.xml><?xml version="1.0" encoding="utf-8"?>
 <p:sld xmlns:a="http://schemas.openxmlformats.org/drawingml/2006/main" xmlns:r="http://schemas.openxmlformats.org/officeDocument/2006/relationships" xmlns:p="http://schemas.openxmlformats.org/presentationml/2006/main">
   <p:cSld>

</xml_diff>